<commit_message>
2022/03/27 article part work in process
</commit_message>
<xml_diff>
--- a/src/temp/Side Project 2 - Twitter - 20220325.pptx
+++ b/src/temp/Side Project 2 - Twitter - 20220325.pptx
@@ -249,7 +249,7 @@
       <p15:sldGuideLst xmlns:p15="http://schemas.microsoft.com/office/powerpoint/2012/main"/>
     </p:ext>
     <p:ext uri="http://customooxmlschemas.google.com/">
-      <go:slidesCustomData xmlns="" xmlns:mc="http://schemas.openxmlformats.org/markup-compatibility/2006" xmlns:mv="urn:schemas-microsoft-com:mac:vml" xmlns:c="http://schemas.openxmlformats.org/drawingml/2006/chart" xmlns:dgm="http://schemas.openxmlformats.org/drawingml/2006/diagram" xmlns:o="urn:schemas-microsoft-com:office:office" xmlns:v="urn:schemas-microsoft-com:vml" xmlns:pvml="urn:schemas-microsoft-com:office:powerpoint" xmlns:com="http://schemas.openxmlformats.org/drawingml/2006/compatibility" xmlns:p14="http://schemas.microsoft.com/office/powerpoint/2010/main" xmlns:p15="http://schemas.microsoft.com/office/powerpoint/2012/main" xmlns:ahyp="http://schemas.microsoft.com/office/drawing/2018/hyperlinkcolor" xmlns:go="http://customooxmlschemas.google.com/" r:id="rId31" roundtripDataSignature="AMtx7miETvuCxyb/aovtkXNfwQbfcnBs9A=="/>
+      <go:slidesCustomData xmlns:go="http://customooxmlschemas.google.com/" xmlns:ahyp="http://schemas.microsoft.com/office/drawing/2018/hyperlinkcolor" xmlns:p15="http://schemas.microsoft.com/office/powerpoint/2012/main" xmlns:p14="http://schemas.microsoft.com/office/powerpoint/2010/main" xmlns:com="http://schemas.openxmlformats.org/drawingml/2006/compatibility" xmlns:pvml="urn:schemas-microsoft-com:office:powerpoint" xmlns:v="urn:schemas-microsoft-com:vml" xmlns:o="urn:schemas-microsoft-com:office:office" xmlns:dgm="http://schemas.openxmlformats.org/drawingml/2006/diagram" xmlns:c="http://schemas.openxmlformats.org/drawingml/2006/chart" xmlns:mv="urn:schemas-microsoft-com:mac:vml" xmlns:mc="http://schemas.openxmlformats.org/markup-compatibility/2006" xmlns="" r:id="rId31" roundtripDataSignature="AMtx7miETvuCxyb/aovtkXNfwQbfcnBs9A=="/>
     </p:ext>
   </p:extLst>
 </p:presentation>
@@ -14912,7 +14912,7 @@
           <p:nvPr>
             <p:extLst>
               <p:ext uri="{D42A27DB-BD31-4B8C-83A1-F6EECF244321}">
-                <p14:modId xmlns:p14="http://schemas.microsoft.com/office/powerpoint/2010/main" val="275462568"/>
+                <p14:modId xmlns:p14="http://schemas.microsoft.com/office/powerpoint/2010/main" val="2569959303"/>
               </p:ext>
             </p:extLst>
           </p:nvPr>
@@ -18765,7 +18765,7 @@
                     <a:bodyPr/>
                     <a:lstStyle/>
                     <a:p>
-                      <a:pPr marL="0" marR="0" lvl="0" indent="0" algn="ctr" rtl="0">
+                      <a:pPr marL="0" marR="0" lvl="0" indent="0" algn="ctr" defTabSz="914400" rtl="0" eaLnBrk="1" fontAlgn="auto" latinLnBrk="0" hangingPunct="1">
                         <a:lnSpc>
                           <a:spcPct val="100000"/>
                         </a:lnSpc>
@@ -18781,16 +18781,21 @@
                         <a:buSzPts val="1800"/>
                         <a:buFont typeface="Arial"/>
                         <a:buNone/>
+                        <a:tabLst/>
+                        <a:defRPr/>
                       </a:pPr>
-                      <a:endParaRPr sz="1600" b="0" i="0" u="none" strike="noStrike" cap="none" dirty="0">
-                        <a:solidFill>
-                          <a:schemeClr val="dk1"/>
-                        </a:solidFill>
-                        <a:latin typeface="Microsoft JhengHei"/>
-                        <a:ea typeface="Microsoft JhengHei"/>
-                        <a:cs typeface="Microsoft JhengHei"/>
-                        <a:sym typeface="Microsoft JhengHei"/>
-                      </a:endParaRPr>
+                      <a:r>
+                        <a:rPr lang="en-US" altLang="zh-TW" sz="1600" b="0" i="0" u="none" strike="noStrike" cap="none" dirty="0" smtClean="0">
+                          <a:solidFill>
+                            <a:schemeClr val="dk1"/>
+                          </a:solidFill>
+                          <a:latin typeface="Microsoft JhengHei"/>
+                          <a:ea typeface="Microsoft JhengHei"/>
+                          <a:cs typeface="Microsoft JhengHei"/>
+                          <a:sym typeface="Microsoft JhengHei"/>
+                        </a:rPr>
+                        <a:t>Not Null (UK)</a:t>
+                      </a:r>
                     </a:p>
                   </a:txBody>
                   <a:tcPr marL="91450" marR="91450" marT="45725" marB="45725" anchor="ctr">

</xml_diff>